<commit_message>
Fix link in powerpoint presentation
</commit_message>
<xml_diff>
--- a/ietf-102/ietf-102-rift-hackathon-slides.pptx
+++ b/ietf-102/ietf-102-rift-hackathon-slides.pptx
@@ -2675,7 +2675,13 @@
               <a:rPr lang="en-US" dirty="0">
                 <a:hlinkClick r:id="rId2"/>
               </a:rPr>
-              <a:t>https://github.com/brunorijsman/rift-fsm</a:t>
+              <a:t>https://github.com/brunorijsman</a:t>
+            </a:r>
+            <a:r>
+              <a:rPr lang="en-US">
+                <a:hlinkClick r:id="rId2"/>
+              </a:rPr>
+              <a:t>/rift-python</a:t>
             </a:r>
             <a:endParaRPr lang="en-US" dirty="0"/>
           </a:p>

</xml_diff>

<commit_message>
Minor fix in slides
</commit_message>
<xml_diff>
--- a/ietf-102/ietf-102-rift-hackathon-slides.pptx
+++ b/ietf-102/ietf-102-rift-hackathon-slides.pptx
@@ -207,7 +207,7 @@
           <a:p>
             <a:fld id="{A08FE638-260D-B941-8E8C-D2CC58B1EB6A}" type="datetimeFigureOut">
               <a:rPr lang="en-US" smtClean="0"/>
-              <a:t>7/18/18</a:t>
+              <a:t>7/19/18</a:t>
             </a:fld>
             <a:endParaRPr lang="en-US"/>
           </a:p>
@@ -3182,8 +3182,13 @@
           <a:p>
             <a:r>
               <a:rPr lang="en-US" dirty="0"/>
-              <a:t>Substantive and editorial discussions about the specification</a:t>
-            </a:r>
+              <a:t>Additional minor comments on draft </a:t>
+            </a:r>
+            <a:r>
+              <a:rPr lang="en-US"/>
+              <a:t>while implementing ZTP</a:t>
+            </a:r>
+            <a:endParaRPr lang="en-US" dirty="0"/>
           </a:p>
           <a:p>
             <a:endParaRPr lang="en-US" dirty="0"/>

</xml_diff>

<commit_message>
Store PDF of slides
</commit_message>
<xml_diff>
--- a/ietf-102/ietf-102-rift-hackathon-slides.pptx
+++ b/ietf-102/ietf-102-rift-hackathon-slides.pptx
@@ -207,7 +207,7 @@
           <a:p>
             <a:fld id="{A08FE638-260D-B941-8E8C-D2CC58B1EB6A}" type="datetimeFigureOut">
               <a:rPr lang="en-US" smtClean="0"/>
-              <a:t>7/19/18</a:t>
+              <a:t>7/20/18</a:t>
             </a:fld>
             <a:endParaRPr lang="en-US"/>
           </a:p>
@@ -1705,6 +1705,49 @@
               <a:t>1</a:t>
             </a:fld>
             <a:endParaRPr lang="en-US" dirty="0"/>
+          </a:p>
+        </p:txBody>
+      </p:sp>
+      <p:sp>
+        <p:nvSpPr>
+          <p:cNvPr id="5" name="TextBox 4">
+            <a:extLst>
+              <a:ext uri="{FF2B5EF4-FFF2-40B4-BE49-F238E27FC236}">
+                <a16:creationId xmlns:a16="http://schemas.microsoft.com/office/drawing/2014/main" id="{B6F2BFCD-31EB-7F43-B283-28AD8DE9724F}"/>
+              </a:ext>
+            </a:extLst>
+          </p:cNvPr>
+          <p:cNvSpPr txBox="1"/>
+          <p:nvPr/>
+        </p:nvSpPr>
+        <p:spPr>
+          <a:xfrm>
+            <a:off x="4006485" y="6352143"/>
+            <a:ext cx="4179029" cy="369332"/>
+          </a:xfrm>
+          <a:prstGeom prst="rect">
+            <a:avLst/>
+          </a:prstGeom>
+          <a:noFill/>
+        </p:spPr>
+        <p:txBody>
+          <a:bodyPr wrap="none" rtlCol="0">
+            <a:spAutoFit/>
+          </a:bodyPr>
+          <a:lstStyle/>
+          <a:p>
+            <a:r>
+              <a:rPr lang="en-US" dirty="0"/>
+              <a:t>Bruno Rijsman (</a:t>
+            </a:r>
+            <a:r>
+              <a:rPr lang="en-US" dirty="0" err="1"/>
+              <a:t>brunorijsman@gmail.com</a:t>
+            </a:r>
+            <a:r>
+              <a:rPr lang="en-US" dirty="0"/>
+              <a:t>)</a:t>
+            </a:r>
           </a:p>
         </p:txBody>
       </p:sp>

</xml_diff>